<commit_message>
minor improvement ntainer initially width 0px and visible with backgroundcolor file management
</commit_message>
<xml_diff>
--- a/meta/concept.pptx
+++ b/meta/concept.pptx
@@ -3295,6 +3295,426 @@
           </a:prstGeom>
         </p:spPr>
       </p:pic>
+      <p:sp>
+        <p:nvSpPr>
+          <p:cNvPr id="19" name="Ellipse 18"/>
+          <p:cNvSpPr/>
+          <p:nvPr/>
+        </p:nvSpPr>
+        <p:spPr>
+          <a:xfrm>
+            <a:off x="8393502" y="776377"/>
+            <a:ext cx="3079630" cy="992038"/>
+          </a:xfrm>
+          <a:prstGeom prst="ellipse">
+            <a:avLst/>
+          </a:prstGeom>
+          <a:noFill/>
+          <a:ln w="57150">
+            <a:solidFill>
+              <a:srgbClr val="92D050"/>
+            </a:solidFill>
+          </a:ln>
+        </p:spPr>
+        <p:style>
+          <a:lnRef idx="2">
+            <a:schemeClr val="accent1">
+              <a:shade val="50000"/>
+            </a:schemeClr>
+          </a:lnRef>
+          <a:fillRef idx="1">
+            <a:schemeClr val="accent1"/>
+          </a:fillRef>
+          <a:effectRef idx="0">
+            <a:schemeClr val="accent1"/>
+          </a:effectRef>
+          <a:fontRef idx="minor">
+            <a:schemeClr val="lt1"/>
+          </a:fontRef>
+        </p:style>
+        <p:txBody>
+          <a:bodyPr rtlCol="0" anchor="ctr"/>
+          <a:lstStyle/>
+          <a:p>
+            <a:pPr algn="ctr"/>
+            <a:endParaRPr lang="de-DE"/>
+          </a:p>
+        </p:txBody>
+      </p:sp>
+      <p:sp>
+        <p:nvSpPr>
+          <p:cNvPr id="20" name="Ellipse 19"/>
+          <p:cNvSpPr/>
+          <p:nvPr/>
+        </p:nvSpPr>
+        <p:spPr>
+          <a:xfrm>
+            <a:off x="5512279" y="2751826"/>
+            <a:ext cx="2320506" cy="2122099"/>
+          </a:xfrm>
+          <a:prstGeom prst="ellipse">
+            <a:avLst/>
+          </a:prstGeom>
+          <a:noFill/>
+          <a:ln w="57150">
+            <a:solidFill>
+              <a:srgbClr val="92D050"/>
+            </a:solidFill>
+          </a:ln>
+        </p:spPr>
+        <p:style>
+          <a:lnRef idx="2">
+            <a:schemeClr val="accent1">
+              <a:shade val="50000"/>
+            </a:schemeClr>
+          </a:lnRef>
+          <a:fillRef idx="1">
+            <a:schemeClr val="accent1"/>
+          </a:fillRef>
+          <a:effectRef idx="0">
+            <a:schemeClr val="accent1"/>
+          </a:effectRef>
+          <a:fontRef idx="minor">
+            <a:schemeClr val="lt1"/>
+          </a:fontRef>
+        </p:style>
+        <p:txBody>
+          <a:bodyPr rtlCol="0" anchor="ctr"/>
+          <a:lstStyle/>
+          <a:p>
+            <a:pPr algn="ctr"/>
+            <a:endParaRPr lang="de-DE"/>
+          </a:p>
+        </p:txBody>
+      </p:sp>
+      <p:sp>
+        <p:nvSpPr>
+          <p:cNvPr id="21" name="Ellipse 20"/>
+          <p:cNvSpPr/>
+          <p:nvPr/>
+        </p:nvSpPr>
+        <p:spPr>
+          <a:xfrm>
+            <a:off x="5638800" y="5745192"/>
+            <a:ext cx="3272287" cy="871268"/>
+          </a:xfrm>
+          <a:prstGeom prst="ellipse">
+            <a:avLst/>
+          </a:prstGeom>
+          <a:noFill/>
+          <a:ln w="57150">
+            <a:solidFill>
+              <a:srgbClr val="92D050"/>
+            </a:solidFill>
+          </a:ln>
+        </p:spPr>
+        <p:style>
+          <a:lnRef idx="2">
+            <a:schemeClr val="accent1">
+              <a:shade val="50000"/>
+            </a:schemeClr>
+          </a:lnRef>
+          <a:fillRef idx="1">
+            <a:schemeClr val="accent1"/>
+          </a:fillRef>
+          <a:effectRef idx="0">
+            <a:schemeClr val="accent1"/>
+          </a:effectRef>
+          <a:fontRef idx="minor">
+            <a:schemeClr val="lt1"/>
+          </a:fontRef>
+        </p:style>
+        <p:txBody>
+          <a:bodyPr rtlCol="0" anchor="ctr"/>
+          <a:lstStyle/>
+          <a:p>
+            <a:pPr algn="ctr"/>
+            <a:endParaRPr lang="de-DE"/>
+          </a:p>
+        </p:txBody>
+      </p:sp>
+      <p:sp>
+        <p:nvSpPr>
+          <p:cNvPr id="22" name="Ellipse 21"/>
+          <p:cNvSpPr/>
+          <p:nvPr/>
+        </p:nvSpPr>
+        <p:spPr>
+          <a:xfrm>
+            <a:off x="5512279" y="836762"/>
+            <a:ext cx="1578634" cy="931653"/>
+          </a:xfrm>
+          <a:prstGeom prst="ellipse">
+            <a:avLst/>
+          </a:prstGeom>
+          <a:noFill/>
+          <a:ln w="57150">
+            <a:solidFill>
+              <a:srgbClr val="92D050"/>
+            </a:solidFill>
+          </a:ln>
+        </p:spPr>
+        <p:style>
+          <a:lnRef idx="2">
+            <a:schemeClr val="accent1">
+              <a:shade val="50000"/>
+            </a:schemeClr>
+          </a:lnRef>
+          <a:fillRef idx="1">
+            <a:schemeClr val="accent1"/>
+          </a:fillRef>
+          <a:effectRef idx="0">
+            <a:schemeClr val="accent1"/>
+          </a:effectRef>
+          <a:fontRef idx="minor">
+            <a:schemeClr val="lt1"/>
+          </a:fontRef>
+        </p:style>
+        <p:txBody>
+          <a:bodyPr rtlCol="0" anchor="ctr"/>
+          <a:lstStyle/>
+          <a:p>
+            <a:pPr algn="ctr"/>
+            <a:endParaRPr lang="de-DE"/>
+          </a:p>
+        </p:txBody>
+      </p:sp>
+      <p:sp>
+        <p:nvSpPr>
+          <p:cNvPr id="23" name="Textfeld 22"/>
+          <p:cNvSpPr txBox="1"/>
+          <p:nvPr/>
+        </p:nvSpPr>
+        <p:spPr>
+          <a:xfrm>
+            <a:off x="1095555" y="2009955"/>
+            <a:ext cx="3761117" cy="2031325"/>
+          </a:xfrm>
+          <a:prstGeom prst="rect">
+            <a:avLst/>
+          </a:prstGeom>
+          <a:noFill/>
+        </p:spPr>
+        <p:txBody>
+          <a:bodyPr wrap="square" rtlCol="0">
+            <a:spAutoFit/>
+          </a:bodyPr>
+          <a:lstStyle/>
+          <a:p>
+            <a:r>
+              <a:rPr lang="de-DE" dirty="0" err="1" smtClean="0"/>
+              <a:t>Toggle</a:t>
+            </a:r>
+            <a:r>
+              <a:rPr lang="de-DE" dirty="0" smtClean="0"/>
+              <a:t> </a:t>
+            </a:r>
+            <a:r>
+              <a:rPr lang="de-DE" dirty="0" err="1" smtClean="0"/>
+              <a:t>menu</a:t>
+            </a:r>
+            <a:endParaRPr lang="de-DE" dirty="0" smtClean="0"/>
+          </a:p>
+          <a:p>
+            <a:endParaRPr lang="de-DE" dirty="0"/>
+          </a:p>
+          <a:p>
+            <a:r>
+              <a:rPr lang="de-DE" dirty="0" smtClean="0"/>
+              <a:t>View </a:t>
+            </a:r>
+            <a:r>
+              <a:rPr lang="de-DE" dirty="0" err="1" smtClean="0"/>
+              <a:t>progress</a:t>
+            </a:r>
+            <a:endParaRPr lang="de-DE" dirty="0" smtClean="0"/>
+          </a:p>
+          <a:p>
+            <a:endParaRPr lang="de-DE" dirty="0" smtClean="0"/>
+          </a:p>
+          <a:p>
+            <a:r>
+              <a:rPr lang="de-DE" dirty="0" smtClean="0"/>
+              <a:t>View </a:t>
+            </a:r>
+            <a:r>
+              <a:rPr lang="de-DE" dirty="0" err="1" smtClean="0"/>
+              <a:t>playlist</a:t>
+            </a:r>
+            <a:endParaRPr lang="de-DE" dirty="0" smtClean="0"/>
+          </a:p>
+          <a:p>
+            <a:endParaRPr lang="de-DE" dirty="0"/>
+          </a:p>
+          <a:p>
+            <a:r>
+              <a:rPr lang="de-DE" dirty="0" smtClean="0"/>
+              <a:t>Download </a:t>
+            </a:r>
+            <a:r>
+              <a:rPr lang="de-DE" dirty="0" err="1" smtClean="0"/>
+              <a:t>button</a:t>
+            </a:r>
+            <a:endParaRPr lang="de-DE" dirty="0"/>
+          </a:p>
+        </p:txBody>
+      </p:sp>
+      <p:cxnSp>
+        <p:nvCxnSpPr>
+          <p:cNvPr id="25" name="Gerade Verbindung mit Pfeil 24"/>
+          <p:cNvCxnSpPr/>
+          <p:nvPr/>
+        </p:nvCxnSpPr>
+        <p:spPr>
+          <a:xfrm>
+            <a:off x="2872596" y="3856008"/>
+            <a:ext cx="2766204" cy="2216988"/>
+          </a:xfrm>
+          <a:prstGeom prst="straightConnector1">
+            <a:avLst/>
+          </a:prstGeom>
+          <a:ln w="57150">
+            <a:solidFill>
+              <a:schemeClr val="accent6">
+                <a:lumMod val="60000"/>
+                <a:lumOff val="40000"/>
+              </a:schemeClr>
+            </a:solidFill>
+            <a:tailEnd type="triangle"/>
+          </a:ln>
+        </p:spPr>
+        <p:style>
+          <a:lnRef idx="1">
+            <a:schemeClr val="accent1"/>
+          </a:lnRef>
+          <a:fillRef idx="0">
+            <a:schemeClr val="accent1"/>
+          </a:fillRef>
+          <a:effectRef idx="0">
+            <a:schemeClr val="accent1"/>
+          </a:effectRef>
+          <a:fontRef idx="minor">
+            <a:schemeClr val="tx1"/>
+          </a:fontRef>
+        </p:style>
+      </p:cxnSp>
+      <p:cxnSp>
+        <p:nvCxnSpPr>
+          <p:cNvPr id="27" name="Gerade Verbindung mit Pfeil 26"/>
+          <p:cNvCxnSpPr/>
+          <p:nvPr/>
+        </p:nvCxnSpPr>
+        <p:spPr>
+          <a:xfrm>
+            <a:off x="2415396" y="3321170"/>
+            <a:ext cx="3010619" cy="405441"/>
+          </a:xfrm>
+          <a:prstGeom prst="straightConnector1">
+            <a:avLst/>
+          </a:prstGeom>
+          <a:ln w="57150">
+            <a:solidFill>
+              <a:schemeClr val="accent6">
+                <a:lumMod val="60000"/>
+                <a:lumOff val="40000"/>
+              </a:schemeClr>
+            </a:solidFill>
+            <a:tailEnd type="triangle"/>
+          </a:ln>
+        </p:spPr>
+        <p:style>
+          <a:lnRef idx="1">
+            <a:schemeClr val="accent1"/>
+          </a:lnRef>
+          <a:fillRef idx="0">
+            <a:schemeClr val="accent1"/>
+          </a:fillRef>
+          <a:effectRef idx="0">
+            <a:schemeClr val="accent1"/>
+          </a:effectRef>
+          <a:fontRef idx="minor">
+            <a:schemeClr val="tx1"/>
+          </a:fontRef>
+        </p:style>
+      </p:cxnSp>
+      <p:cxnSp>
+        <p:nvCxnSpPr>
+          <p:cNvPr id="29" name="Gerade Verbindung mit Pfeil 28"/>
+          <p:cNvCxnSpPr/>
+          <p:nvPr/>
+        </p:nvCxnSpPr>
+        <p:spPr>
+          <a:xfrm flipV="1">
+            <a:off x="2536166" y="1449238"/>
+            <a:ext cx="5857336" cy="1302588"/>
+          </a:xfrm>
+          <a:prstGeom prst="straightConnector1">
+            <a:avLst/>
+          </a:prstGeom>
+          <a:ln w="57150">
+            <a:solidFill>
+              <a:schemeClr val="accent6">
+                <a:lumMod val="60000"/>
+                <a:lumOff val="40000"/>
+              </a:schemeClr>
+            </a:solidFill>
+            <a:tailEnd type="triangle"/>
+          </a:ln>
+        </p:spPr>
+        <p:style>
+          <a:lnRef idx="1">
+            <a:schemeClr val="accent1"/>
+          </a:lnRef>
+          <a:fillRef idx="0">
+            <a:schemeClr val="accent1"/>
+          </a:fillRef>
+          <a:effectRef idx="0">
+            <a:schemeClr val="accent1"/>
+          </a:effectRef>
+          <a:fontRef idx="minor">
+            <a:schemeClr val="tx1"/>
+          </a:fontRef>
+        </p:style>
+      </p:cxnSp>
+      <p:cxnSp>
+        <p:nvCxnSpPr>
+          <p:cNvPr id="31" name="Gerade Verbindung mit Pfeil 30"/>
+          <p:cNvCxnSpPr/>
+          <p:nvPr/>
+        </p:nvCxnSpPr>
+        <p:spPr>
+          <a:xfrm flipV="1">
+            <a:off x="2415396" y="1423358"/>
+            <a:ext cx="3096883" cy="828136"/>
+          </a:xfrm>
+          <a:prstGeom prst="straightConnector1">
+            <a:avLst/>
+          </a:prstGeom>
+          <a:ln w="57150">
+            <a:solidFill>
+              <a:schemeClr val="accent6">
+                <a:lumMod val="60000"/>
+                <a:lumOff val="40000"/>
+              </a:schemeClr>
+            </a:solidFill>
+            <a:tailEnd type="triangle"/>
+          </a:ln>
+        </p:spPr>
+        <p:style>
+          <a:lnRef idx="1">
+            <a:schemeClr val="accent1"/>
+          </a:lnRef>
+          <a:fillRef idx="0">
+            <a:schemeClr val="accent1"/>
+          </a:fillRef>
+          <a:effectRef idx="0">
+            <a:schemeClr val="accent1"/>
+          </a:effectRef>
+          <a:fontRef idx="minor">
+            <a:schemeClr val="tx1"/>
+          </a:fontRef>
+        </p:style>
+      </p:cxnSp>
     </p:spTree>
     <p:extLst>
       <p:ext uri="{BB962C8B-B14F-4D97-AF65-F5344CB8AC3E}">

</xml_diff>